<commit_message>
another go at sec 5 -- now ready for JWB review
</commit_message>
<xml_diff>
--- a/FGCS-2019/example-abstract-events.pptx
+++ b/FGCS-2019/example-abstract-events.pptx
@@ -259,7 +259,7 @@
           <a:p>
             <a:fld id="{39317EA7-CC4A-4A48-AF76-5FB0F739C852}" type="datetimeFigureOut">
               <a:rPr lang="en-US" smtClean="0"/>
-              <a:t>2/23/20</a:t>
+              <a:t>2/24/20</a:t>
             </a:fld>
             <a:endParaRPr lang="en-US"/>
           </a:p>
@@ -457,7 +457,7 @@
           <a:p>
             <a:fld id="{39317EA7-CC4A-4A48-AF76-5FB0F739C852}" type="datetimeFigureOut">
               <a:rPr lang="en-US" smtClean="0"/>
-              <a:t>2/23/20</a:t>
+              <a:t>2/24/20</a:t>
             </a:fld>
             <a:endParaRPr lang="en-US"/>
           </a:p>
@@ -665,7 +665,7 @@
           <a:p>
             <a:fld id="{39317EA7-CC4A-4A48-AF76-5FB0F739C852}" type="datetimeFigureOut">
               <a:rPr lang="en-US" smtClean="0"/>
-              <a:t>2/23/20</a:t>
+              <a:t>2/24/20</a:t>
             </a:fld>
             <a:endParaRPr lang="en-US"/>
           </a:p>
@@ -863,7 +863,7 @@
           <a:p>
             <a:fld id="{39317EA7-CC4A-4A48-AF76-5FB0F739C852}" type="datetimeFigureOut">
               <a:rPr lang="en-US" smtClean="0"/>
-              <a:t>2/23/20</a:t>
+              <a:t>2/24/20</a:t>
             </a:fld>
             <a:endParaRPr lang="en-US"/>
           </a:p>
@@ -1138,7 +1138,7 @@
           <a:p>
             <a:fld id="{39317EA7-CC4A-4A48-AF76-5FB0F739C852}" type="datetimeFigureOut">
               <a:rPr lang="en-US" smtClean="0"/>
-              <a:t>2/23/20</a:t>
+              <a:t>2/24/20</a:t>
             </a:fld>
             <a:endParaRPr lang="en-US"/>
           </a:p>
@@ -1403,7 +1403,7 @@
           <a:p>
             <a:fld id="{39317EA7-CC4A-4A48-AF76-5FB0F739C852}" type="datetimeFigureOut">
               <a:rPr lang="en-US" smtClean="0"/>
-              <a:t>2/23/20</a:t>
+              <a:t>2/24/20</a:t>
             </a:fld>
             <a:endParaRPr lang="en-US"/>
           </a:p>
@@ -1815,7 +1815,7 @@
           <a:p>
             <a:fld id="{39317EA7-CC4A-4A48-AF76-5FB0F739C852}" type="datetimeFigureOut">
               <a:rPr lang="en-US" smtClean="0"/>
-              <a:t>2/23/20</a:t>
+              <a:t>2/24/20</a:t>
             </a:fld>
             <a:endParaRPr lang="en-US"/>
           </a:p>
@@ -1956,7 +1956,7 @@
           <a:p>
             <a:fld id="{39317EA7-CC4A-4A48-AF76-5FB0F739C852}" type="datetimeFigureOut">
               <a:rPr lang="en-US" smtClean="0"/>
-              <a:t>2/23/20</a:t>
+              <a:t>2/24/20</a:t>
             </a:fld>
             <a:endParaRPr lang="en-US"/>
           </a:p>
@@ -2069,7 +2069,7 @@
           <a:p>
             <a:fld id="{39317EA7-CC4A-4A48-AF76-5FB0F739C852}" type="datetimeFigureOut">
               <a:rPr lang="en-US" smtClean="0"/>
-              <a:t>2/23/20</a:t>
+              <a:t>2/24/20</a:t>
             </a:fld>
             <a:endParaRPr lang="en-US"/>
           </a:p>
@@ -2380,7 +2380,7 @@
           <a:p>
             <a:fld id="{39317EA7-CC4A-4A48-AF76-5FB0F739C852}" type="datetimeFigureOut">
               <a:rPr lang="en-US" smtClean="0"/>
-              <a:t>2/23/20</a:t>
+              <a:t>2/24/20</a:t>
             </a:fld>
             <a:endParaRPr lang="en-US"/>
           </a:p>
@@ -2668,7 +2668,7 @@
           <a:p>
             <a:fld id="{39317EA7-CC4A-4A48-AF76-5FB0F739C852}" type="datetimeFigureOut">
               <a:rPr lang="en-US" smtClean="0"/>
-              <a:t>2/23/20</a:t>
+              <a:t>2/24/20</a:t>
             </a:fld>
             <a:endParaRPr lang="en-US"/>
           </a:p>
@@ -2909,7 +2909,7 @@
           <a:p>
             <a:fld id="{39317EA7-CC4A-4A48-AF76-5FB0F739C852}" type="datetimeFigureOut">
               <a:rPr lang="en-US" smtClean="0"/>
-              <a:t>2/23/20</a:t>
+              <a:t>2/24/20</a:t>
             </a:fld>
             <a:endParaRPr lang="en-US"/>
           </a:p>
@@ -3328,10 +3328,10 @@
       </p:grpSpPr>
       <p:sp>
         <p:nvSpPr>
-          <p:cNvPr id="68" name="Rounded Rectangle 67">
-            <a:extLst>
-              <a:ext uri="{FF2B5EF4-FFF2-40B4-BE49-F238E27FC236}">
-                <a16:creationId xmlns:a16="http://schemas.microsoft.com/office/drawing/2014/main" id="{B2C69836-63FA-9948-A047-87EEC2C9AC7A}"/>
+          <p:cNvPr id="103" name="Rounded Rectangle 102">
+            <a:extLst>
+              <a:ext uri="{FF2B5EF4-FFF2-40B4-BE49-F238E27FC236}">
+                <a16:creationId xmlns:a16="http://schemas.microsoft.com/office/drawing/2014/main" id="{C1F542CE-8902-0C47-939E-F98271FBC2BE}"/>
               </a:ext>
             </a:extLst>
           </p:cNvPr>
@@ -3340,8 +3340,8 @@
         </p:nvSpPr>
         <p:spPr>
           <a:xfrm>
-            <a:off x="4979504" y="926428"/>
-            <a:ext cx="2324439" cy="2353435"/>
+            <a:off x="7932855" y="1029667"/>
+            <a:ext cx="1645815" cy="1865253"/>
           </a:xfrm>
           <a:prstGeom prst="roundRect">
             <a:avLst/>
@@ -3375,6 +3375,53 @@
       </p:sp>
       <p:sp>
         <p:nvSpPr>
+          <p:cNvPr id="68" name="Rounded Rectangle 67">
+            <a:extLst>
+              <a:ext uri="{FF2B5EF4-FFF2-40B4-BE49-F238E27FC236}">
+                <a16:creationId xmlns:a16="http://schemas.microsoft.com/office/drawing/2014/main" id="{B2C69836-63FA-9948-A047-87EEC2C9AC7A}"/>
+              </a:ext>
+            </a:extLst>
+          </p:cNvPr>
+          <p:cNvSpPr/>
+          <p:nvPr/>
+        </p:nvSpPr>
+        <p:spPr>
+          <a:xfrm>
+            <a:off x="2286000" y="707767"/>
+            <a:ext cx="2324439" cy="2353435"/>
+          </a:xfrm>
+          <a:prstGeom prst="roundRect">
+            <a:avLst/>
+          </a:prstGeom>
+        </p:spPr>
+        <p:style>
+          <a:lnRef idx="2">
+            <a:schemeClr val="accent1"/>
+          </a:lnRef>
+          <a:fillRef idx="1">
+            <a:schemeClr val="lt1"/>
+          </a:fillRef>
+          <a:effectRef idx="0">
+            <a:schemeClr val="accent1"/>
+          </a:effectRef>
+          <a:fontRef idx="minor">
+            <a:schemeClr val="dk1"/>
+          </a:fontRef>
+        </p:style>
+        <p:txBody>
+          <a:bodyPr rtlCol="0" anchor="t"/>
+          <a:lstStyle/>
+          <a:p>
+            <a:pPr algn="r"/>
+            <a:r>
+              <a:rPr lang="en-US" dirty="0"/>
+              <a:t>V*</a:t>
+            </a:r>
+          </a:p>
+        </p:txBody>
+      </p:sp>
+      <p:sp>
+        <p:nvSpPr>
           <p:cNvPr id="25" name="TextBox 24">
             <a:extLst>
               <a:ext uri="{FF2B5EF4-FFF2-40B4-BE49-F238E27FC236}">
@@ -3387,7 +3434,7 @@
         </p:nvSpPr>
         <p:spPr>
           <a:xfrm>
-            <a:off x="5179994" y="1528975"/>
+            <a:off x="2486490" y="1310314"/>
             <a:ext cx="420638" cy="369332"/>
           </a:xfrm>
           <a:prstGeom prst="rect">
@@ -3427,7 +3474,7 @@
         </p:nvSpPr>
         <p:spPr>
           <a:xfrm>
-            <a:off x="5068522" y="1437195"/>
+            <a:off x="2375018" y="1218534"/>
             <a:ext cx="557212" cy="552893"/>
           </a:xfrm>
           <a:prstGeom prst="ellipse">
@@ -3484,7 +3531,7 @@
         </p:nvSpPr>
         <p:spPr>
           <a:xfrm>
-            <a:off x="5206915" y="2542303"/>
+            <a:off x="2513411" y="2323642"/>
             <a:ext cx="420638" cy="369332"/>
           </a:xfrm>
           <a:prstGeom prst="rect">
@@ -3524,7 +3571,7 @@
         </p:nvSpPr>
         <p:spPr>
           <a:xfrm>
-            <a:off x="5095443" y="2450523"/>
+            <a:off x="2401939" y="2231862"/>
             <a:ext cx="557212" cy="552893"/>
           </a:xfrm>
           <a:prstGeom prst="ellipse">
@@ -3581,7 +3628,7 @@
         </p:nvSpPr>
         <p:spPr>
           <a:xfrm>
-            <a:off x="6614542" y="1953302"/>
+            <a:off x="3921038" y="1734641"/>
             <a:ext cx="420638" cy="369332"/>
           </a:xfrm>
           <a:prstGeom prst="rect">
@@ -3620,7 +3667,7 @@
         </p:nvSpPr>
         <p:spPr>
           <a:xfrm>
-            <a:off x="6503070" y="1861522"/>
+            <a:off x="3809566" y="1642861"/>
             <a:ext cx="557212" cy="552893"/>
           </a:xfrm>
           <a:prstGeom prst="ellipse">
@@ -3677,7 +3724,7 @@
         </p:nvSpPr>
         <p:spPr>
           <a:xfrm>
-            <a:off x="7854221" y="1861522"/>
+            <a:off x="5160717" y="1642861"/>
             <a:ext cx="557212" cy="552893"/>
           </a:xfrm>
           <a:prstGeom prst="ellipse">
@@ -3734,7 +3781,7 @@
         </p:nvSpPr>
         <p:spPr>
           <a:xfrm>
-            <a:off x="7954047" y="1954395"/>
+            <a:off x="5260543" y="1735734"/>
             <a:ext cx="427567" cy="369332"/>
           </a:xfrm>
           <a:prstGeom prst="rect">
@@ -3773,7 +3820,7 @@
         </p:nvGrpSpPr>
         <p:grpSpPr>
           <a:xfrm>
-            <a:off x="3638169" y="1442535"/>
+            <a:off x="944665" y="1223874"/>
             <a:ext cx="557212" cy="552893"/>
             <a:chOff x="3995977" y="1442535"/>
             <a:chExt cx="557212" cy="552893"/>
@@ -3890,7 +3937,7 @@
         </p:nvGrpSpPr>
         <p:grpSpPr>
           <a:xfrm>
-            <a:off x="3594794" y="2450523"/>
+            <a:off x="901290" y="2231862"/>
             <a:ext cx="557212" cy="552893"/>
             <a:chOff x="4002298" y="2450523"/>
             <a:chExt cx="557212" cy="552893"/>
@@ -4007,7 +4054,7 @@
         </p:nvSpPr>
         <p:spPr>
           <a:xfrm>
-            <a:off x="4226801" y="2229749"/>
+            <a:off x="1533297" y="2011088"/>
             <a:ext cx="448211" cy="369332"/>
           </a:xfrm>
           <a:prstGeom prst="rect">
@@ -4046,7 +4093,7 @@
         </p:nvSpPr>
         <p:spPr>
           <a:xfrm>
-            <a:off x="7184675" y="1676856"/>
+            <a:off x="4491171" y="1458195"/>
             <a:ext cx="545152" cy="369332"/>
           </a:xfrm>
           <a:prstGeom prst="rect">
@@ -4088,7 +4135,7 @@
         </p:nvCxnSpPr>
         <p:spPr>
           <a:xfrm flipH="1">
-            <a:off x="4195381" y="1713642"/>
+            <a:off x="1501877" y="1494981"/>
             <a:ext cx="873141" cy="5340"/>
           </a:xfrm>
           <a:prstGeom prst="straightConnector1">
@@ -4131,7 +4178,7 @@
         </p:nvCxnSpPr>
         <p:spPr>
           <a:xfrm flipH="1">
-            <a:off x="4122187" y="2726970"/>
+            <a:off x="1428683" y="2508309"/>
             <a:ext cx="973256" cy="1092"/>
           </a:xfrm>
           <a:prstGeom prst="straightConnector1">
@@ -4174,7 +4221,7 @@
         </p:nvCxnSpPr>
         <p:spPr>
           <a:xfrm flipH="1">
-            <a:off x="7060282" y="2137969"/>
+            <a:off x="4366778" y="1919308"/>
             <a:ext cx="793939" cy="0"/>
           </a:xfrm>
           <a:prstGeom prst="straightConnector1">
@@ -4216,7 +4263,7 @@
         </p:nvCxnSpPr>
         <p:spPr>
           <a:xfrm flipH="1" flipV="1">
-            <a:off x="5600632" y="1713643"/>
+            <a:off x="2907128" y="1494982"/>
             <a:ext cx="902438" cy="424326"/>
           </a:xfrm>
           <a:prstGeom prst="straightConnector1">
@@ -4256,7 +4303,7 @@
         </p:nvSpPr>
         <p:spPr>
           <a:xfrm>
-            <a:off x="4667707" y="4433388"/>
+            <a:off x="1974203" y="4214727"/>
             <a:ext cx="888749" cy="369332"/>
           </a:xfrm>
           <a:prstGeom prst="rect">
@@ -4295,7 +4342,7 @@
         </p:nvSpPr>
         <p:spPr>
           <a:xfrm>
-            <a:off x="5846333" y="4646086"/>
+            <a:off x="3152829" y="4427425"/>
             <a:ext cx="420638" cy="369332"/>
           </a:xfrm>
           <a:prstGeom prst="rect">
@@ -4335,7 +4382,7 @@
         </p:nvSpPr>
         <p:spPr>
           <a:xfrm>
-            <a:off x="5734861" y="4554306"/>
+            <a:off x="3041357" y="4335645"/>
             <a:ext cx="557212" cy="552893"/>
           </a:xfrm>
           <a:prstGeom prst="ellipse">
@@ -4392,7 +4439,7 @@
         </p:nvGrpSpPr>
         <p:grpSpPr>
           <a:xfrm>
-            <a:off x="7470888" y="4554306"/>
+            <a:off x="4777384" y="4335645"/>
             <a:ext cx="557212" cy="552893"/>
             <a:chOff x="7013688" y="4554306"/>
             <a:chExt cx="557212" cy="552893"/>
@@ -4509,7 +4556,7 @@
         </p:nvGrpSpPr>
         <p:grpSpPr>
           <a:xfrm>
-            <a:off x="3939511" y="4548246"/>
+            <a:off x="1246007" y="4329585"/>
             <a:ext cx="557212" cy="552893"/>
             <a:chOff x="4575616" y="4548246"/>
             <a:chExt cx="557212" cy="552893"/>
@@ -4626,7 +4673,7 @@
         </p:nvSpPr>
         <p:spPr>
           <a:xfrm>
-            <a:off x="4538096" y="5089978"/>
+            <a:off x="1844592" y="4871317"/>
             <a:ext cx="545152" cy="369332"/>
           </a:xfrm>
           <a:prstGeom prst="rect">
@@ -4665,7 +4712,7 @@
         </p:nvSpPr>
         <p:spPr>
           <a:xfrm>
-            <a:off x="6443433" y="4439621"/>
+            <a:off x="3749929" y="4220960"/>
             <a:ext cx="888749" cy="369332"/>
           </a:xfrm>
           <a:prstGeom prst="rect">
@@ -4708,7 +4755,7 @@
         </p:nvCxnSpPr>
         <p:spPr>
           <a:xfrm flipH="1" flipV="1">
-            <a:off x="4466904" y="4825785"/>
+            <a:off x="1773400" y="4607124"/>
             <a:ext cx="1267957" cy="4968"/>
           </a:xfrm>
           <a:prstGeom prst="straightConnector1">
@@ -4751,7 +4798,7 @@
         </p:nvCxnSpPr>
         <p:spPr>
           <a:xfrm flipH="1">
-            <a:off x="4471560" y="5026230"/>
+            <a:off x="1778056" y="4807569"/>
             <a:ext cx="1344903" cy="628895"/>
           </a:xfrm>
           <a:prstGeom prst="straightConnector1">
@@ -4794,7 +4841,7 @@
         </p:nvCxnSpPr>
         <p:spPr>
           <a:xfrm flipH="1" flipV="1">
-            <a:off x="6292073" y="4830753"/>
+            <a:off x="3598569" y="4612092"/>
             <a:ext cx="1278641" cy="1092"/>
           </a:xfrm>
           <a:prstGeom prst="straightConnector1">
@@ -4833,7 +4880,7 @@
         </p:nvSpPr>
         <p:spPr>
           <a:xfrm>
-            <a:off x="5918657" y="3430913"/>
+            <a:off x="3225153" y="3212252"/>
             <a:ext cx="524777" cy="824042"/>
           </a:xfrm>
           <a:prstGeom prst="downArrow">
@@ -4880,7 +4927,7 @@
         </p:nvSpPr>
         <p:spPr>
           <a:xfrm>
-            <a:off x="4334093" y="1319144"/>
+            <a:off x="1640589" y="1100483"/>
             <a:ext cx="556092" cy="369332"/>
           </a:xfrm>
           <a:prstGeom prst="rect">
@@ -4919,7 +4966,7 @@
         </p:nvSpPr>
         <p:spPr>
           <a:xfrm>
-            <a:off x="6584672" y="3647661"/>
+            <a:off x="3891168" y="3429000"/>
             <a:ext cx="978473" cy="307777"/>
           </a:xfrm>
           <a:prstGeom prst="rect">
@@ -4954,7 +5001,7 @@
         </p:nvGrpSpPr>
         <p:grpSpPr>
           <a:xfrm>
-            <a:off x="3806686" y="5218043"/>
+            <a:off x="1113182" y="4999382"/>
             <a:ext cx="664874" cy="713528"/>
             <a:chOff x="4452730" y="5218043"/>
             <a:chExt cx="664874" cy="713528"/>
@@ -5106,7 +5153,7 @@
         </p:nvCxnSpPr>
         <p:spPr>
           <a:xfrm rot="5400000">
-            <a:off x="5975814" y="2958183"/>
+            <a:off x="3282310" y="2739522"/>
             <a:ext cx="2393433" cy="569443"/>
           </a:xfrm>
           <a:prstGeom prst="curvedConnector3">
@@ -5155,7 +5202,7 @@
         </p:nvCxnSpPr>
         <p:spPr>
           <a:xfrm rot="16200000" flipH="1">
-            <a:off x="3489654" y="2810960"/>
+            <a:off x="796150" y="2592299"/>
             <a:ext cx="2744912" cy="499943"/>
           </a:xfrm>
           <a:prstGeom prst="curvedConnector3">
@@ -5204,7 +5251,7 @@
         </p:nvCxnSpPr>
         <p:spPr>
           <a:xfrm rot="16200000" flipH="1">
-            <a:off x="3385341" y="3664646"/>
+            <a:off x="691837" y="3445985"/>
             <a:ext cx="2490897" cy="359765"/>
           </a:xfrm>
           <a:prstGeom prst="curvedConnector3">
@@ -5237,6 +5284,1263 @@
           </a:fontRef>
         </p:style>
       </p:cxnSp>
+      <p:sp>
+        <p:nvSpPr>
+          <p:cNvPr id="4" name="TextBox 3">
+            <a:extLst>
+              <a:ext uri="{FF2B5EF4-FFF2-40B4-BE49-F238E27FC236}">
+                <a16:creationId xmlns:a16="http://schemas.microsoft.com/office/drawing/2014/main" id="{64961CF2-09EF-4A40-81DB-0A52E761E8EC}"/>
+              </a:ext>
+            </a:extLst>
+          </p:cNvPr>
+          <p:cNvSpPr txBox="1"/>
+          <p:nvPr/>
+        </p:nvSpPr>
+        <p:spPr>
+          <a:xfrm>
+            <a:off x="3041357" y="6082748"/>
+            <a:ext cx="1357936" cy="338554"/>
+          </a:xfrm>
+          <a:prstGeom prst="rect">
+            <a:avLst/>
+          </a:prstGeom>
+          <a:noFill/>
+        </p:spPr>
+        <p:txBody>
+          <a:bodyPr wrap="none" rtlCol="0">
+            <a:spAutoFit/>
+          </a:bodyPr>
+          <a:lstStyle/>
+          <a:p>
+            <a:r>
+              <a:rPr lang="en-US" sz="1600" dirty="0"/>
+              <a:t>(a) e-grouping</a:t>
+            </a:r>
+          </a:p>
+        </p:txBody>
+      </p:sp>
+      <p:sp>
+        <p:nvSpPr>
+          <p:cNvPr id="5" name="Rectangle 4">
+            <a:extLst>
+              <a:ext uri="{FF2B5EF4-FFF2-40B4-BE49-F238E27FC236}">
+                <a16:creationId xmlns:a16="http://schemas.microsoft.com/office/drawing/2014/main" id="{940E8621-BCAE-6741-82ED-E8769F5FE21E}"/>
+              </a:ext>
+            </a:extLst>
+          </p:cNvPr>
+          <p:cNvSpPr/>
+          <p:nvPr/>
+        </p:nvSpPr>
+        <p:spPr>
+          <a:xfrm>
+            <a:off x="7792709" y="6051970"/>
+            <a:ext cx="1516249" cy="369332"/>
+          </a:xfrm>
+          <a:prstGeom prst="rect">
+            <a:avLst/>
+          </a:prstGeom>
+        </p:spPr>
+        <p:txBody>
+          <a:bodyPr wrap="none">
+            <a:spAutoFit/>
+          </a:bodyPr>
+          <a:lstStyle/>
+          <a:p>
+            <a:r>
+              <a:rPr lang="en-US" dirty="0"/>
+              <a:t>(b) a-grouping</a:t>
+            </a:r>
+          </a:p>
+        </p:txBody>
+      </p:sp>
+      <p:sp>
+        <p:nvSpPr>
+          <p:cNvPr id="52" name="TextBox 51">
+            <a:extLst>
+              <a:ext uri="{FF2B5EF4-FFF2-40B4-BE49-F238E27FC236}">
+                <a16:creationId xmlns:a16="http://schemas.microsoft.com/office/drawing/2014/main" id="{9B4D6958-DD75-7D4C-96BC-44B9741ABFDD}"/>
+              </a:ext>
+            </a:extLst>
+          </p:cNvPr>
+          <p:cNvSpPr txBox="1"/>
+          <p:nvPr/>
+        </p:nvSpPr>
+        <p:spPr>
+          <a:xfrm>
+            <a:off x="7600513" y="4301540"/>
+            <a:ext cx="600698" cy="369332"/>
+          </a:xfrm>
+          <a:prstGeom prst="rect">
+            <a:avLst/>
+          </a:prstGeom>
+          <a:noFill/>
+        </p:spPr>
+        <p:txBody>
+          <a:bodyPr wrap="square" rtlCol="0">
+            <a:spAutoFit/>
+          </a:bodyPr>
+          <a:lstStyle/>
+          <a:p>
+            <a:r>
+              <a:rPr lang="en-US" dirty="0"/>
+              <a:t>u</a:t>
+            </a:r>
+            <a:r>
+              <a:rPr lang="en-US" baseline="-25000" dirty="0"/>
+              <a:t>1N</a:t>
+            </a:r>
+          </a:p>
+        </p:txBody>
+      </p:sp>
+      <p:sp>
+        <p:nvSpPr>
+          <p:cNvPr id="53" name="TextBox 52">
+            <a:extLst>
+              <a:ext uri="{FF2B5EF4-FFF2-40B4-BE49-F238E27FC236}">
+                <a16:creationId xmlns:a16="http://schemas.microsoft.com/office/drawing/2014/main" id="{4879BE41-775C-D647-919D-E2B303E6D242}"/>
+              </a:ext>
+            </a:extLst>
+          </p:cNvPr>
+          <p:cNvSpPr txBox="1"/>
+          <p:nvPr/>
+        </p:nvSpPr>
+        <p:spPr>
+          <a:xfrm>
+            <a:off x="8510783" y="4514238"/>
+            <a:ext cx="420638" cy="369332"/>
+          </a:xfrm>
+          <a:prstGeom prst="rect">
+            <a:avLst/>
+          </a:prstGeom>
+          <a:noFill/>
+        </p:spPr>
+        <p:txBody>
+          <a:bodyPr wrap="square" rtlCol="0">
+            <a:spAutoFit/>
+          </a:bodyPr>
+          <a:lstStyle/>
+          <a:p>
+            <a:r>
+              <a:rPr lang="en-US" dirty="0" err="1"/>
+              <a:t>a</a:t>
+            </a:r>
+            <a:r>
+              <a:rPr lang="en-US" baseline="-25000" dirty="0" err="1"/>
+              <a:t>N</a:t>
+            </a:r>
+            <a:endParaRPr lang="en-US" baseline="-25000" dirty="0"/>
+          </a:p>
+        </p:txBody>
+      </p:sp>
+      <p:sp>
+        <p:nvSpPr>
+          <p:cNvPr id="60" name="Oval 59">
+            <a:extLst>
+              <a:ext uri="{FF2B5EF4-FFF2-40B4-BE49-F238E27FC236}">
+                <a16:creationId xmlns:a16="http://schemas.microsoft.com/office/drawing/2014/main" id="{B3631723-13F2-4A4A-BC65-0556B5F0845C}"/>
+              </a:ext>
+            </a:extLst>
+          </p:cNvPr>
+          <p:cNvSpPr/>
+          <p:nvPr/>
+        </p:nvSpPr>
+        <p:spPr>
+          <a:xfrm>
+            <a:off x="8399311" y="4422458"/>
+            <a:ext cx="557212" cy="552893"/>
+          </a:xfrm>
+          <a:prstGeom prst="ellipse">
+            <a:avLst/>
+          </a:prstGeom>
+          <a:noFill/>
+          <a:ln>
+            <a:solidFill>
+              <a:schemeClr val="tx1"/>
+            </a:solidFill>
+          </a:ln>
+        </p:spPr>
+        <p:style>
+          <a:lnRef idx="2">
+            <a:schemeClr val="accent1">
+              <a:shade val="50000"/>
+            </a:schemeClr>
+          </a:lnRef>
+          <a:fillRef idx="1">
+            <a:schemeClr val="accent1"/>
+          </a:fillRef>
+          <a:effectRef idx="0">
+            <a:schemeClr val="accent1"/>
+          </a:effectRef>
+          <a:fontRef idx="minor">
+            <a:schemeClr val="lt1"/>
+          </a:fontRef>
+        </p:style>
+        <p:txBody>
+          <a:bodyPr rot="0" spcFirstLastPara="0" vertOverflow="overflow" horzOverflow="overflow" vert="horz" wrap="square" lIns="91440" tIns="45720" rIns="91440" bIns="45720" numCol="1" spcCol="0" rtlCol="0" fromWordArt="0" anchor="ctr" anchorCtr="0" forceAA="0" compatLnSpc="1">
+            <a:prstTxWarp prst="textNoShape">
+              <a:avLst/>
+            </a:prstTxWarp>
+            <a:noAutofit/>
+          </a:bodyPr>
+          <a:lstStyle/>
+          <a:p>
+            <a:pPr algn="ctr"/>
+            <a:endParaRPr lang="en-US"/>
+          </a:p>
+        </p:txBody>
+      </p:sp>
+      <p:grpSp>
+        <p:nvGrpSpPr>
+          <p:cNvPr id="62" name="Group 61">
+            <a:extLst>
+              <a:ext uri="{FF2B5EF4-FFF2-40B4-BE49-F238E27FC236}">
+                <a16:creationId xmlns:a16="http://schemas.microsoft.com/office/drawing/2014/main" id="{5D398340-8BD9-C042-AAAE-E9042CC055F7}"/>
+              </a:ext>
+            </a:extLst>
+          </p:cNvPr>
+          <p:cNvGrpSpPr/>
+          <p:nvPr/>
+        </p:nvGrpSpPr>
+        <p:grpSpPr>
+          <a:xfrm>
+            <a:off x="10135338" y="4422458"/>
+            <a:ext cx="557212" cy="552893"/>
+            <a:chOff x="7013688" y="4554306"/>
+            <a:chExt cx="557212" cy="552893"/>
+          </a:xfrm>
+        </p:grpSpPr>
+        <p:sp>
+          <p:nvSpPr>
+            <p:cNvPr id="63" name="Oval 62">
+              <a:extLst>
+                <a:ext uri="{FF2B5EF4-FFF2-40B4-BE49-F238E27FC236}">
+                  <a16:creationId xmlns:a16="http://schemas.microsoft.com/office/drawing/2014/main" id="{5E6AC175-5E52-4848-8596-AE365BB32A73}"/>
+                </a:ext>
+              </a:extLst>
+            </p:cNvPr>
+            <p:cNvSpPr/>
+            <p:nvPr/>
+          </p:nvSpPr>
+          <p:spPr>
+            <a:xfrm>
+              <a:off x="7013688" y="4554306"/>
+              <a:ext cx="557212" cy="552893"/>
+            </a:xfrm>
+            <a:prstGeom prst="ellipse">
+              <a:avLst/>
+            </a:prstGeom>
+            <a:noFill/>
+            <a:ln>
+              <a:solidFill>
+                <a:schemeClr val="tx1"/>
+              </a:solidFill>
+            </a:ln>
+          </p:spPr>
+          <p:style>
+            <a:lnRef idx="2">
+              <a:schemeClr val="accent1">
+                <a:shade val="50000"/>
+              </a:schemeClr>
+            </a:lnRef>
+            <a:fillRef idx="1">
+              <a:schemeClr val="accent1"/>
+            </a:fillRef>
+            <a:effectRef idx="0">
+              <a:schemeClr val="accent1"/>
+            </a:effectRef>
+            <a:fontRef idx="minor">
+              <a:schemeClr val="lt1"/>
+            </a:fontRef>
+          </p:style>
+          <p:txBody>
+            <a:bodyPr rot="0" spcFirstLastPara="0" vertOverflow="overflow" horzOverflow="overflow" vert="horz" wrap="square" lIns="91440" tIns="45720" rIns="91440" bIns="45720" numCol="1" spcCol="0" rtlCol="0" fromWordArt="0" anchor="ctr" anchorCtr="0" forceAA="0" compatLnSpc="1">
+              <a:prstTxWarp prst="textNoShape">
+                <a:avLst/>
+              </a:prstTxWarp>
+              <a:noAutofit/>
+            </a:bodyPr>
+            <a:lstStyle/>
+            <a:p>
+              <a:pPr algn="ctr"/>
+              <a:endParaRPr lang="en-US"/>
+            </a:p>
+          </p:txBody>
+        </p:sp>
+        <p:sp>
+          <p:nvSpPr>
+            <p:cNvPr id="65" name="TextBox 64">
+              <a:extLst>
+                <a:ext uri="{FF2B5EF4-FFF2-40B4-BE49-F238E27FC236}">
+                  <a16:creationId xmlns:a16="http://schemas.microsoft.com/office/drawing/2014/main" id="{28A91B39-5FC9-2D4C-9B1C-03A94F5FBC30}"/>
+                </a:ext>
+              </a:extLst>
+            </p:cNvPr>
+            <p:cNvSpPr txBox="1"/>
+            <p:nvPr/>
+          </p:nvSpPr>
+          <p:spPr>
+            <a:xfrm>
+              <a:off x="7113514" y="4647179"/>
+              <a:ext cx="427567" cy="369332"/>
+            </a:xfrm>
+            <a:prstGeom prst="rect">
+              <a:avLst/>
+            </a:prstGeom>
+            <a:noFill/>
+          </p:spPr>
+          <p:txBody>
+            <a:bodyPr wrap="square" rtlCol="0">
+              <a:spAutoFit/>
+            </a:bodyPr>
+            <a:lstStyle/>
+            <a:p>
+              <a:r>
+                <a:rPr lang="en-US" dirty="0"/>
+                <a:t>a</a:t>
+              </a:r>
+              <a:r>
+                <a:rPr lang="en-US" baseline="-25000" dirty="0"/>
+                <a:t>2</a:t>
+              </a:r>
+            </a:p>
+          </p:txBody>
+        </p:sp>
+      </p:grpSp>
+      <p:grpSp>
+        <p:nvGrpSpPr>
+          <p:cNvPr id="66" name="Group 65">
+            <a:extLst>
+              <a:ext uri="{FF2B5EF4-FFF2-40B4-BE49-F238E27FC236}">
+                <a16:creationId xmlns:a16="http://schemas.microsoft.com/office/drawing/2014/main" id="{E3D0FE4E-3C47-8A48-8093-79F134E9E5C7}"/>
+              </a:ext>
+            </a:extLst>
+          </p:cNvPr>
+          <p:cNvGrpSpPr/>
+          <p:nvPr/>
+        </p:nvGrpSpPr>
+        <p:grpSpPr>
+          <a:xfrm>
+            <a:off x="6603961" y="4416398"/>
+            <a:ext cx="557212" cy="552893"/>
+            <a:chOff x="4575616" y="4548246"/>
+            <a:chExt cx="557212" cy="552893"/>
+          </a:xfrm>
+        </p:grpSpPr>
+        <p:sp>
+          <p:nvSpPr>
+            <p:cNvPr id="67" name="Oval 66">
+              <a:extLst>
+                <a:ext uri="{FF2B5EF4-FFF2-40B4-BE49-F238E27FC236}">
+                  <a16:creationId xmlns:a16="http://schemas.microsoft.com/office/drawing/2014/main" id="{C496BADD-2C58-C349-A540-1B1CD5C0EC5D}"/>
+                </a:ext>
+              </a:extLst>
+            </p:cNvPr>
+            <p:cNvSpPr/>
+            <p:nvPr/>
+          </p:nvSpPr>
+          <p:spPr>
+            <a:xfrm>
+              <a:off x="4575616" y="4548246"/>
+              <a:ext cx="557212" cy="552893"/>
+            </a:xfrm>
+            <a:prstGeom prst="ellipse">
+              <a:avLst/>
+            </a:prstGeom>
+            <a:noFill/>
+            <a:ln>
+              <a:solidFill>
+                <a:schemeClr val="tx1"/>
+              </a:solidFill>
+            </a:ln>
+          </p:spPr>
+          <p:style>
+            <a:lnRef idx="2">
+              <a:schemeClr val="accent1">
+                <a:shade val="50000"/>
+              </a:schemeClr>
+            </a:lnRef>
+            <a:fillRef idx="1">
+              <a:schemeClr val="accent1"/>
+            </a:fillRef>
+            <a:effectRef idx="0">
+              <a:schemeClr val="accent1"/>
+            </a:effectRef>
+            <a:fontRef idx="minor">
+              <a:schemeClr val="lt1"/>
+            </a:fontRef>
+          </p:style>
+          <p:txBody>
+            <a:bodyPr rot="0" spcFirstLastPara="0" vertOverflow="overflow" horzOverflow="overflow" vert="horz" wrap="square" lIns="91440" tIns="45720" rIns="91440" bIns="45720" numCol="1" spcCol="0" rtlCol="0" fromWordArt="0" anchor="ctr" anchorCtr="0" forceAA="0" compatLnSpc="1">
+              <a:prstTxWarp prst="textNoShape">
+                <a:avLst/>
+              </a:prstTxWarp>
+              <a:noAutofit/>
+            </a:bodyPr>
+            <a:lstStyle/>
+            <a:p>
+              <a:pPr algn="ctr"/>
+              <a:endParaRPr lang="en-US"/>
+            </a:p>
+          </p:txBody>
+        </p:sp>
+        <p:sp>
+          <p:nvSpPr>
+            <p:cNvPr id="70" name="TextBox 69">
+              <a:extLst>
+                <a:ext uri="{FF2B5EF4-FFF2-40B4-BE49-F238E27FC236}">
+                  <a16:creationId xmlns:a16="http://schemas.microsoft.com/office/drawing/2014/main" id="{B2EE72F8-6A5E-604B-8F07-47084C841FB7}"/>
+                </a:ext>
+              </a:extLst>
+            </p:cNvPr>
+            <p:cNvSpPr txBox="1"/>
+            <p:nvPr/>
+          </p:nvSpPr>
+          <p:spPr>
+            <a:xfrm>
+              <a:off x="4675442" y="4641119"/>
+              <a:ext cx="427567" cy="369332"/>
+            </a:xfrm>
+            <a:prstGeom prst="rect">
+              <a:avLst/>
+            </a:prstGeom>
+            <a:noFill/>
+          </p:spPr>
+          <p:txBody>
+            <a:bodyPr wrap="square" rtlCol="0">
+              <a:spAutoFit/>
+            </a:bodyPr>
+            <a:lstStyle/>
+            <a:p>
+              <a:r>
+                <a:rPr lang="en-US" dirty="0"/>
+                <a:t>e</a:t>
+              </a:r>
+              <a:r>
+                <a:rPr lang="en-US" baseline="-25000" dirty="0"/>
+                <a:t>1</a:t>
+              </a:r>
+            </a:p>
+          </p:txBody>
+        </p:sp>
+      </p:grpSp>
+      <p:sp>
+        <p:nvSpPr>
+          <p:cNvPr id="80" name="TextBox 79">
+            <a:extLst>
+              <a:ext uri="{FF2B5EF4-FFF2-40B4-BE49-F238E27FC236}">
+                <a16:creationId xmlns:a16="http://schemas.microsoft.com/office/drawing/2014/main" id="{6BA8F59E-1044-2641-BB60-A1DE9FB248D8}"/>
+              </a:ext>
+            </a:extLst>
+          </p:cNvPr>
+          <p:cNvSpPr txBox="1"/>
+          <p:nvPr/>
+        </p:nvSpPr>
+        <p:spPr>
+          <a:xfrm>
+            <a:off x="9296724" y="4307773"/>
+            <a:ext cx="557213" cy="369332"/>
+          </a:xfrm>
+          <a:prstGeom prst="rect">
+            <a:avLst/>
+          </a:prstGeom>
+          <a:noFill/>
+        </p:spPr>
+        <p:txBody>
+          <a:bodyPr wrap="square" rtlCol="0">
+            <a:spAutoFit/>
+          </a:bodyPr>
+          <a:lstStyle/>
+          <a:p>
+            <a:r>
+              <a:rPr lang="en-US" dirty="0"/>
+              <a:t>g</a:t>
+            </a:r>
+            <a:r>
+              <a:rPr lang="en-US" baseline="-25000" dirty="0"/>
+              <a:t>N2</a:t>
+            </a:r>
+          </a:p>
+        </p:txBody>
+      </p:sp>
+      <p:cxnSp>
+        <p:nvCxnSpPr>
+          <p:cNvPr id="81" name="Straight Arrow Connector 80">
+            <a:extLst>
+              <a:ext uri="{FF2B5EF4-FFF2-40B4-BE49-F238E27FC236}">
+                <a16:creationId xmlns:a16="http://schemas.microsoft.com/office/drawing/2014/main" id="{74BF30C2-3429-014E-8036-4EA3F0CD55C4}"/>
+              </a:ext>
+            </a:extLst>
+          </p:cNvPr>
+          <p:cNvCxnSpPr>
+            <a:cxnSpLocks/>
+            <a:stCxn id="60" idx="2"/>
+            <a:endCxn id="70" idx="3"/>
+          </p:cNvCxnSpPr>
+          <p:nvPr/>
+        </p:nvCxnSpPr>
+        <p:spPr>
+          <a:xfrm flipH="1" flipV="1">
+            <a:off x="7131354" y="4693937"/>
+            <a:ext cx="1267957" cy="4968"/>
+          </a:xfrm>
+          <a:prstGeom prst="straightConnector1">
+            <a:avLst/>
+          </a:prstGeom>
+          <a:ln>
+            <a:tailEnd type="triangle"/>
+          </a:ln>
+        </p:spPr>
+        <p:style>
+          <a:lnRef idx="1">
+            <a:schemeClr val="accent1"/>
+          </a:lnRef>
+          <a:fillRef idx="0">
+            <a:schemeClr val="accent1"/>
+          </a:fillRef>
+          <a:effectRef idx="0">
+            <a:schemeClr val="accent1"/>
+          </a:effectRef>
+          <a:fontRef idx="minor">
+            <a:schemeClr val="tx1"/>
+          </a:fontRef>
+        </p:style>
+      </p:cxnSp>
+      <p:cxnSp>
+        <p:nvCxnSpPr>
+          <p:cNvPr id="85" name="Straight Arrow Connector 84">
+            <a:extLst>
+              <a:ext uri="{FF2B5EF4-FFF2-40B4-BE49-F238E27FC236}">
+                <a16:creationId xmlns:a16="http://schemas.microsoft.com/office/drawing/2014/main" id="{67D3D44E-BDA2-574A-AD6A-4743D6A3853F}"/>
+              </a:ext>
+            </a:extLst>
+          </p:cNvPr>
+          <p:cNvCxnSpPr>
+            <a:cxnSpLocks/>
+            <a:stCxn id="65" idx="1"/>
+            <a:endCxn id="60" idx="6"/>
+          </p:cNvCxnSpPr>
+          <p:nvPr/>
+        </p:nvCxnSpPr>
+        <p:spPr>
+          <a:xfrm flipH="1" flipV="1">
+            <a:off x="8956523" y="4698905"/>
+            <a:ext cx="1278641" cy="1092"/>
+          </a:xfrm>
+          <a:prstGeom prst="straightConnector1">
+            <a:avLst/>
+          </a:prstGeom>
+          <a:ln>
+            <a:tailEnd type="triangle"/>
+          </a:ln>
+        </p:spPr>
+        <p:style>
+          <a:lnRef idx="1">
+            <a:schemeClr val="accent1"/>
+          </a:lnRef>
+          <a:fillRef idx="0">
+            <a:schemeClr val="accent1"/>
+          </a:fillRef>
+          <a:effectRef idx="0">
+            <a:schemeClr val="accent1"/>
+          </a:effectRef>
+          <a:fontRef idx="minor">
+            <a:schemeClr val="tx1"/>
+          </a:fontRef>
+        </p:style>
+      </p:cxnSp>
+      <p:grpSp>
+        <p:nvGrpSpPr>
+          <p:cNvPr id="91" name="Group 90">
+            <a:extLst>
+              <a:ext uri="{FF2B5EF4-FFF2-40B4-BE49-F238E27FC236}">
+                <a16:creationId xmlns:a16="http://schemas.microsoft.com/office/drawing/2014/main" id="{55D68DA0-BA8A-6D4D-A35B-E1EA161DAC2F}"/>
+              </a:ext>
+            </a:extLst>
+          </p:cNvPr>
+          <p:cNvGrpSpPr/>
+          <p:nvPr/>
+        </p:nvGrpSpPr>
+        <p:grpSpPr>
+          <a:xfrm>
+            <a:off x="8399311" y="1193367"/>
+            <a:ext cx="557212" cy="552893"/>
+            <a:chOff x="4575616" y="4548246"/>
+            <a:chExt cx="557212" cy="552893"/>
+          </a:xfrm>
+        </p:grpSpPr>
+        <p:sp>
+          <p:nvSpPr>
+            <p:cNvPr id="92" name="Oval 91">
+              <a:extLst>
+                <a:ext uri="{FF2B5EF4-FFF2-40B4-BE49-F238E27FC236}">
+                  <a16:creationId xmlns:a16="http://schemas.microsoft.com/office/drawing/2014/main" id="{F3DC86E8-D8D1-8846-8D2B-9C9512AAC1A7}"/>
+                </a:ext>
+              </a:extLst>
+            </p:cNvPr>
+            <p:cNvSpPr/>
+            <p:nvPr/>
+          </p:nvSpPr>
+          <p:spPr>
+            <a:xfrm>
+              <a:off x="4575616" y="4548246"/>
+              <a:ext cx="557212" cy="552893"/>
+            </a:xfrm>
+            <a:prstGeom prst="ellipse">
+              <a:avLst/>
+            </a:prstGeom>
+            <a:noFill/>
+            <a:ln>
+              <a:solidFill>
+                <a:schemeClr val="tx1"/>
+              </a:solidFill>
+            </a:ln>
+          </p:spPr>
+          <p:style>
+            <a:lnRef idx="2">
+              <a:schemeClr val="accent1">
+                <a:shade val="50000"/>
+              </a:schemeClr>
+            </a:lnRef>
+            <a:fillRef idx="1">
+              <a:schemeClr val="accent1"/>
+            </a:fillRef>
+            <a:effectRef idx="0">
+              <a:schemeClr val="accent1"/>
+            </a:effectRef>
+            <a:fontRef idx="minor">
+              <a:schemeClr val="lt1"/>
+            </a:fontRef>
+          </p:style>
+          <p:txBody>
+            <a:bodyPr rot="0" spcFirstLastPara="0" vertOverflow="overflow" horzOverflow="overflow" vert="horz" wrap="square" lIns="91440" tIns="45720" rIns="91440" bIns="45720" numCol="1" spcCol="0" rtlCol="0" fromWordArt="0" anchor="ctr" anchorCtr="0" forceAA="0" compatLnSpc="1">
+              <a:prstTxWarp prst="textNoShape">
+                <a:avLst/>
+              </a:prstTxWarp>
+              <a:noAutofit/>
+            </a:bodyPr>
+            <a:lstStyle/>
+            <a:p>
+              <a:pPr algn="ctr"/>
+              <a:endParaRPr lang="en-US"/>
+            </a:p>
+          </p:txBody>
+        </p:sp>
+        <p:sp>
+          <p:nvSpPr>
+            <p:cNvPr id="93" name="TextBox 92">
+              <a:extLst>
+                <a:ext uri="{FF2B5EF4-FFF2-40B4-BE49-F238E27FC236}">
+                  <a16:creationId xmlns:a16="http://schemas.microsoft.com/office/drawing/2014/main" id="{46CEDBDD-5A32-E54F-B814-11BA3E7531E2}"/>
+                </a:ext>
+              </a:extLst>
+            </p:cNvPr>
+            <p:cNvSpPr txBox="1"/>
+            <p:nvPr/>
+          </p:nvSpPr>
+          <p:spPr>
+            <a:xfrm>
+              <a:off x="4675442" y="4641119"/>
+              <a:ext cx="427567" cy="369332"/>
+            </a:xfrm>
+            <a:prstGeom prst="rect">
+              <a:avLst/>
+            </a:prstGeom>
+            <a:noFill/>
+          </p:spPr>
+          <p:txBody>
+            <a:bodyPr wrap="square" rtlCol="0">
+              <a:spAutoFit/>
+            </a:bodyPr>
+            <a:lstStyle/>
+            <a:p>
+              <a:r>
+                <a:rPr lang="en-US" dirty="0"/>
+                <a:t>a</a:t>
+              </a:r>
+              <a:r>
+                <a:rPr lang="en-US" baseline="-25000" dirty="0"/>
+                <a:t>1</a:t>
+              </a:r>
+            </a:p>
+          </p:txBody>
+        </p:sp>
+      </p:grpSp>
+      <p:grpSp>
+        <p:nvGrpSpPr>
+          <p:cNvPr id="94" name="Group 93">
+            <a:extLst>
+              <a:ext uri="{FF2B5EF4-FFF2-40B4-BE49-F238E27FC236}">
+                <a16:creationId xmlns:a16="http://schemas.microsoft.com/office/drawing/2014/main" id="{A625873F-69F5-F243-A66E-865519AE8E98}"/>
+              </a:ext>
+            </a:extLst>
+          </p:cNvPr>
+          <p:cNvGrpSpPr/>
+          <p:nvPr/>
+        </p:nvGrpSpPr>
+        <p:grpSpPr>
+          <a:xfrm>
+            <a:off x="8399311" y="2159095"/>
+            <a:ext cx="557212" cy="552893"/>
+            <a:chOff x="4575616" y="4548246"/>
+            <a:chExt cx="557212" cy="552893"/>
+          </a:xfrm>
+        </p:grpSpPr>
+        <p:sp>
+          <p:nvSpPr>
+            <p:cNvPr id="95" name="Oval 94">
+              <a:extLst>
+                <a:ext uri="{FF2B5EF4-FFF2-40B4-BE49-F238E27FC236}">
+                  <a16:creationId xmlns:a16="http://schemas.microsoft.com/office/drawing/2014/main" id="{3CD15095-F199-734E-8481-2310CC6E93C0}"/>
+                </a:ext>
+              </a:extLst>
+            </p:cNvPr>
+            <p:cNvSpPr/>
+            <p:nvPr/>
+          </p:nvSpPr>
+          <p:spPr>
+            <a:xfrm>
+              <a:off x="4575616" y="4548246"/>
+              <a:ext cx="557212" cy="552893"/>
+            </a:xfrm>
+            <a:prstGeom prst="ellipse">
+              <a:avLst/>
+            </a:prstGeom>
+            <a:noFill/>
+            <a:ln>
+              <a:solidFill>
+                <a:schemeClr val="tx1"/>
+              </a:solidFill>
+            </a:ln>
+          </p:spPr>
+          <p:style>
+            <a:lnRef idx="2">
+              <a:schemeClr val="accent1">
+                <a:shade val="50000"/>
+              </a:schemeClr>
+            </a:lnRef>
+            <a:fillRef idx="1">
+              <a:schemeClr val="accent1"/>
+            </a:fillRef>
+            <a:effectRef idx="0">
+              <a:schemeClr val="accent1"/>
+            </a:effectRef>
+            <a:fontRef idx="minor">
+              <a:schemeClr val="lt1"/>
+            </a:fontRef>
+          </p:style>
+          <p:txBody>
+            <a:bodyPr rot="0" spcFirstLastPara="0" vertOverflow="overflow" horzOverflow="overflow" vert="horz" wrap="square" lIns="91440" tIns="45720" rIns="91440" bIns="45720" numCol="1" spcCol="0" rtlCol="0" fromWordArt="0" anchor="ctr" anchorCtr="0" forceAA="0" compatLnSpc="1">
+              <a:prstTxWarp prst="textNoShape">
+                <a:avLst/>
+              </a:prstTxWarp>
+              <a:noAutofit/>
+            </a:bodyPr>
+            <a:lstStyle/>
+            <a:p>
+              <a:pPr algn="ctr"/>
+              <a:endParaRPr lang="en-US"/>
+            </a:p>
+          </p:txBody>
+        </p:sp>
+        <p:sp>
+          <p:nvSpPr>
+            <p:cNvPr id="96" name="TextBox 95">
+              <a:extLst>
+                <a:ext uri="{FF2B5EF4-FFF2-40B4-BE49-F238E27FC236}">
+                  <a16:creationId xmlns:a16="http://schemas.microsoft.com/office/drawing/2014/main" id="{C17CC206-FCD1-4944-8E86-11668F88F5CD}"/>
+                </a:ext>
+              </a:extLst>
+            </p:cNvPr>
+            <p:cNvSpPr txBox="1"/>
+            <p:nvPr/>
+          </p:nvSpPr>
+          <p:spPr>
+            <a:xfrm>
+              <a:off x="4675442" y="4641119"/>
+              <a:ext cx="427567" cy="369332"/>
+            </a:xfrm>
+            <a:prstGeom prst="rect">
+              <a:avLst/>
+            </a:prstGeom>
+            <a:noFill/>
+          </p:spPr>
+          <p:txBody>
+            <a:bodyPr wrap="square" rtlCol="0">
+              <a:spAutoFit/>
+            </a:bodyPr>
+            <a:lstStyle/>
+            <a:p>
+              <a:r>
+                <a:rPr lang="en-US" dirty="0"/>
+                <a:t>a</a:t>
+              </a:r>
+              <a:r>
+                <a:rPr lang="en-US" baseline="-25000" dirty="0"/>
+                <a:t>2</a:t>
+              </a:r>
+            </a:p>
+          </p:txBody>
+        </p:sp>
+      </p:grpSp>
+      <p:sp>
+        <p:nvSpPr>
+          <p:cNvPr id="97" name="Oval 96">
+            <a:extLst>
+              <a:ext uri="{FF2B5EF4-FFF2-40B4-BE49-F238E27FC236}">
+                <a16:creationId xmlns:a16="http://schemas.microsoft.com/office/drawing/2014/main" id="{977DB2F0-4941-4F47-92DF-4D82997FB8A9}"/>
+              </a:ext>
+            </a:extLst>
+          </p:cNvPr>
+          <p:cNvSpPr/>
+          <p:nvPr/>
+        </p:nvSpPr>
+        <p:spPr>
+          <a:xfrm>
+            <a:off x="7251249" y="1199120"/>
+            <a:ext cx="557212" cy="552893"/>
+          </a:xfrm>
+          <a:prstGeom prst="ellipse">
+            <a:avLst/>
+          </a:prstGeom>
+          <a:noFill/>
+          <a:ln>
+            <a:solidFill>
+              <a:schemeClr val="tx1"/>
+            </a:solidFill>
+          </a:ln>
+        </p:spPr>
+        <p:style>
+          <a:lnRef idx="2">
+            <a:schemeClr val="accent1">
+              <a:shade val="50000"/>
+            </a:schemeClr>
+          </a:lnRef>
+          <a:fillRef idx="1">
+            <a:schemeClr val="accent1"/>
+          </a:fillRef>
+          <a:effectRef idx="0">
+            <a:schemeClr val="accent1"/>
+          </a:effectRef>
+          <a:fontRef idx="minor">
+            <a:schemeClr val="lt1"/>
+          </a:fontRef>
+        </p:style>
+        <p:txBody>
+          <a:bodyPr rot="0" spcFirstLastPara="0" vertOverflow="overflow" horzOverflow="overflow" vert="horz" wrap="square" lIns="91440" tIns="45720" rIns="91440" bIns="45720" numCol="1" spcCol="0" rtlCol="0" fromWordArt="0" anchor="ctr" anchorCtr="0" forceAA="0" compatLnSpc="1">
+            <a:prstTxWarp prst="textNoShape">
+              <a:avLst/>
+            </a:prstTxWarp>
+            <a:noAutofit/>
+          </a:bodyPr>
+          <a:lstStyle/>
+          <a:p>
+            <a:pPr algn="ctr"/>
+            <a:endParaRPr lang="en-US"/>
+          </a:p>
+        </p:txBody>
+      </p:sp>
+      <p:sp>
+        <p:nvSpPr>
+          <p:cNvPr id="98" name="TextBox 97">
+            <a:extLst>
+              <a:ext uri="{FF2B5EF4-FFF2-40B4-BE49-F238E27FC236}">
+                <a16:creationId xmlns:a16="http://schemas.microsoft.com/office/drawing/2014/main" id="{844874B5-36B6-E041-BB0A-4CA285398D6C}"/>
+              </a:ext>
+            </a:extLst>
+          </p:cNvPr>
+          <p:cNvSpPr txBox="1"/>
+          <p:nvPr/>
+        </p:nvSpPr>
+        <p:spPr>
+          <a:xfrm>
+            <a:off x="7348964" y="1272256"/>
+            <a:ext cx="427567" cy="369332"/>
+          </a:xfrm>
+          <a:prstGeom prst="rect">
+            <a:avLst/>
+          </a:prstGeom>
+          <a:noFill/>
+        </p:spPr>
+        <p:txBody>
+          <a:bodyPr wrap="square" rtlCol="0">
+            <a:spAutoFit/>
+          </a:bodyPr>
+          <a:lstStyle/>
+          <a:p>
+            <a:r>
+              <a:rPr lang="en-US" dirty="0"/>
+              <a:t>e</a:t>
+            </a:r>
+            <a:r>
+              <a:rPr lang="en-US" baseline="-25000" dirty="0"/>
+              <a:t>1</a:t>
+            </a:r>
+          </a:p>
+        </p:txBody>
+      </p:sp>
+      <p:grpSp>
+        <p:nvGrpSpPr>
+          <p:cNvPr id="6" name="Group 5">
+            <a:extLst>
+              <a:ext uri="{FF2B5EF4-FFF2-40B4-BE49-F238E27FC236}">
+                <a16:creationId xmlns:a16="http://schemas.microsoft.com/office/drawing/2014/main" id="{85EC18A5-F352-EB40-AB84-B86411D9FE59}"/>
+              </a:ext>
+            </a:extLst>
+          </p:cNvPr>
+          <p:cNvGrpSpPr/>
+          <p:nvPr/>
+        </p:nvGrpSpPr>
+        <p:grpSpPr>
+          <a:xfrm>
+            <a:off x="9973419" y="2159095"/>
+            <a:ext cx="557212" cy="552893"/>
+            <a:chOff x="7251249" y="2159095"/>
+            <a:chExt cx="557212" cy="552893"/>
+          </a:xfrm>
+        </p:grpSpPr>
+        <p:sp>
+          <p:nvSpPr>
+            <p:cNvPr id="99" name="Oval 98">
+              <a:extLst>
+                <a:ext uri="{FF2B5EF4-FFF2-40B4-BE49-F238E27FC236}">
+                  <a16:creationId xmlns:a16="http://schemas.microsoft.com/office/drawing/2014/main" id="{D946444F-99DE-9140-9885-710006532A76}"/>
+                </a:ext>
+              </a:extLst>
+            </p:cNvPr>
+            <p:cNvSpPr/>
+            <p:nvPr/>
+          </p:nvSpPr>
+          <p:spPr>
+            <a:xfrm>
+              <a:off x="7251249" y="2159095"/>
+              <a:ext cx="557212" cy="552893"/>
+            </a:xfrm>
+            <a:prstGeom prst="ellipse">
+              <a:avLst/>
+            </a:prstGeom>
+            <a:noFill/>
+            <a:ln>
+              <a:solidFill>
+                <a:schemeClr val="tx1"/>
+              </a:solidFill>
+            </a:ln>
+          </p:spPr>
+          <p:style>
+            <a:lnRef idx="2">
+              <a:schemeClr val="accent1">
+                <a:shade val="50000"/>
+              </a:schemeClr>
+            </a:lnRef>
+            <a:fillRef idx="1">
+              <a:schemeClr val="accent1"/>
+            </a:fillRef>
+            <a:effectRef idx="0">
+              <a:schemeClr val="accent1"/>
+            </a:effectRef>
+            <a:fontRef idx="minor">
+              <a:schemeClr val="lt1"/>
+            </a:fontRef>
+          </p:style>
+          <p:txBody>
+            <a:bodyPr rot="0" spcFirstLastPara="0" vertOverflow="overflow" horzOverflow="overflow" vert="horz" wrap="square" lIns="91440" tIns="45720" rIns="91440" bIns="45720" numCol="1" spcCol="0" rtlCol="0" fromWordArt="0" anchor="ctr" anchorCtr="0" forceAA="0" compatLnSpc="1">
+              <a:prstTxWarp prst="textNoShape">
+                <a:avLst/>
+              </a:prstTxWarp>
+              <a:noAutofit/>
+            </a:bodyPr>
+            <a:lstStyle/>
+            <a:p>
+              <a:pPr algn="ctr"/>
+              <a:endParaRPr lang="en-US"/>
+            </a:p>
+          </p:txBody>
+        </p:sp>
+        <p:sp>
+          <p:nvSpPr>
+            <p:cNvPr id="100" name="TextBox 99">
+              <a:extLst>
+                <a:ext uri="{FF2B5EF4-FFF2-40B4-BE49-F238E27FC236}">
+                  <a16:creationId xmlns:a16="http://schemas.microsoft.com/office/drawing/2014/main" id="{AA3D6801-9203-C44B-BA73-8B6AE2C0954C}"/>
+                </a:ext>
+              </a:extLst>
+            </p:cNvPr>
+            <p:cNvSpPr txBox="1"/>
+            <p:nvPr/>
+          </p:nvSpPr>
+          <p:spPr>
+            <a:xfrm>
+              <a:off x="7348964" y="2232231"/>
+              <a:ext cx="427567" cy="369332"/>
+            </a:xfrm>
+            <a:prstGeom prst="rect">
+              <a:avLst/>
+            </a:prstGeom>
+            <a:noFill/>
+          </p:spPr>
+          <p:txBody>
+            <a:bodyPr wrap="square" rtlCol="0">
+              <a:spAutoFit/>
+            </a:bodyPr>
+            <a:lstStyle/>
+            <a:p>
+              <a:r>
+                <a:rPr lang="en-US" dirty="0"/>
+                <a:t>e</a:t>
+              </a:r>
+              <a:r>
+                <a:rPr lang="en-US" baseline="-25000" dirty="0"/>
+                <a:t>2</a:t>
+              </a:r>
+            </a:p>
+          </p:txBody>
+        </p:sp>
+      </p:grpSp>
+      <p:cxnSp>
+        <p:nvCxnSpPr>
+          <p:cNvPr id="101" name="Straight Arrow Connector 100">
+            <a:extLst>
+              <a:ext uri="{FF2B5EF4-FFF2-40B4-BE49-F238E27FC236}">
+                <a16:creationId xmlns:a16="http://schemas.microsoft.com/office/drawing/2014/main" id="{C39B8D66-EEB5-7C4B-B10A-8426373C9146}"/>
+              </a:ext>
+            </a:extLst>
+          </p:cNvPr>
+          <p:cNvCxnSpPr>
+            <a:cxnSpLocks/>
+            <a:stCxn id="99" idx="2"/>
+            <a:endCxn id="96" idx="3"/>
+          </p:cNvCxnSpPr>
+          <p:nvPr/>
+        </p:nvCxnSpPr>
+        <p:spPr>
+          <a:xfrm flipH="1">
+            <a:off x="8926704" y="2435542"/>
+            <a:ext cx="1046715" cy="1092"/>
+          </a:xfrm>
+          <a:prstGeom prst="straightConnector1">
+            <a:avLst/>
+          </a:prstGeom>
+          <a:ln>
+            <a:tailEnd type="triangle"/>
+          </a:ln>
+        </p:spPr>
+        <p:style>
+          <a:lnRef idx="1">
+            <a:schemeClr val="accent1"/>
+          </a:lnRef>
+          <a:fillRef idx="0">
+            <a:schemeClr val="accent1"/>
+          </a:fillRef>
+          <a:effectRef idx="0">
+            <a:schemeClr val="accent1"/>
+          </a:effectRef>
+          <a:fontRef idx="minor">
+            <a:schemeClr val="tx1"/>
+          </a:fontRef>
+        </p:style>
+      </p:cxnSp>
+      <p:cxnSp>
+        <p:nvCxnSpPr>
+          <p:cNvPr id="102" name="Straight Arrow Connector 101">
+            <a:extLst>
+              <a:ext uri="{FF2B5EF4-FFF2-40B4-BE49-F238E27FC236}">
+                <a16:creationId xmlns:a16="http://schemas.microsoft.com/office/drawing/2014/main" id="{A5E720BD-FF8B-8E43-A4E6-3035B930A48F}"/>
+              </a:ext>
+            </a:extLst>
+          </p:cNvPr>
+          <p:cNvCxnSpPr>
+            <a:cxnSpLocks/>
+            <a:stCxn id="92" idx="2"/>
+            <a:endCxn id="98" idx="3"/>
+          </p:cNvCxnSpPr>
+          <p:nvPr/>
+        </p:nvCxnSpPr>
+        <p:spPr>
+          <a:xfrm flipH="1" flipV="1">
+            <a:off x="7776531" y="1456922"/>
+            <a:ext cx="622780" cy="12892"/>
+          </a:xfrm>
+          <a:prstGeom prst="straightConnector1">
+            <a:avLst/>
+          </a:prstGeom>
+          <a:ln>
+            <a:tailEnd type="triangle"/>
+          </a:ln>
+        </p:spPr>
+        <p:style>
+          <a:lnRef idx="1">
+            <a:schemeClr val="accent1"/>
+          </a:lnRef>
+          <a:fillRef idx="0">
+            <a:schemeClr val="accent1"/>
+          </a:fillRef>
+          <a:effectRef idx="0">
+            <a:schemeClr val="accent1"/>
+          </a:effectRef>
+          <a:fontRef idx="minor">
+            <a:schemeClr val="tx1"/>
+          </a:fontRef>
+        </p:style>
+      </p:cxnSp>
+      <p:sp>
+        <p:nvSpPr>
+          <p:cNvPr id="104" name="TextBox 103">
+            <a:extLst>
+              <a:ext uri="{FF2B5EF4-FFF2-40B4-BE49-F238E27FC236}">
+                <a16:creationId xmlns:a16="http://schemas.microsoft.com/office/drawing/2014/main" id="{A315C7B6-A70E-8B41-BDBA-73494D16A6D0}"/>
+              </a:ext>
+            </a:extLst>
+          </p:cNvPr>
+          <p:cNvSpPr txBox="1"/>
+          <p:nvPr/>
+        </p:nvSpPr>
+        <p:spPr>
+          <a:xfrm>
+            <a:off x="7932855" y="1051465"/>
+            <a:ext cx="545152" cy="369332"/>
+          </a:xfrm>
+          <a:prstGeom prst="rect">
+            <a:avLst/>
+          </a:prstGeom>
+          <a:noFill/>
+        </p:spPr>
+        <p:txBody>
+          <a:bodyPr wrap="square" rtlCol="0">
+            <a:spAutoFit/>
+          </a:bodyPr>
+          <a:lstStyle/>
+          <a:p>
+            <a:r>
+              <a:rPr lang="en-US" dirty="0"/>
+              <a:t>u</a:t>
+            </a:r>
+            <a:r>
+              <a:rPr lang="en-US" baseline="-25000" dirty="0"/>
+              <a:t>11</a:t>
+            </a:r>
+          </a:p>
+        </p:txBody>
+      </p:sp>
+      <p:sp>
+        <p:nvSpPr>
+          <p:cNvPr id="105" name="TextBox 104">
+            <a:extLst>
+              <a:ext uri="{FF2B5EF4-FFF2-40B4-BE49-F238E27FC236}">
+                <a16:creationId xmlns:a16="http://schemas.microsoft.com/office/drawing/2014/main" id="{6B1A723F-D900-254E-8941-4D078AB3669F}"/>
+              </a:ext>
+            </a:extLst>
+          </p:cNvPr>
+          <p:cNvSpPr txBox="1"/>
+          <p:nvPr/>
+        </p:nvSpPr>
+        <p:spPr>
+          <a:xfrm>
+            <a:off x="9323267" y="2066209"/>
+            <a:ext cx="545152" cy="369332"/>
+          </a:xfrm>
+          <a:prstGeom prst="rect">
+            <a:avLst/>
+          </a:prstGeom>
+          <a:noFill/>
+        </p:spPr>
+        <p:txBody>
+          <a:bodyPr wrap="square" rtlCol="0">
+            <a:spAutoFit/>
+          </a:bodyPr>
+          <a:lstStyle/>
+          <a:p>
+            <a:r>
+              <a:rPr lang="en-US" dirty="0"/>
+              <a:t>g</a:t>
+            </a:r>
+            <a:r>
+              <a:rPr lang="en-US" baseline="-25000" dirty="0"/>
+              <a:t>22</a:t>
+            </a:r>
+          </a:p>
+        </p:txBody>
+      </p:sp>
+      <p:sp>
+        <p:nvSpPr>
+          <p:cNvPr id="106" name="Down Arrow 105">
+            <a:extLst>
+              <a:ext uri="{FF2B5EF4-FFF2-40B4-BE49-F238E27FC236}">
+                <a16:creationId xmlns:a16="http://schemas.microsoft.com/office/drawing/2014/main" id="{2E168B54-23E6-544C-BE38-02262213379D}"/>
+              </a:ext>
+            </a:extLst>
+          </p:cNvPr>
+          <p:cNvSpPr/>
+          <p:nvPr/>
+        </p:nvSpPr>
+        <p:spPr>
+          <a:xfrm>
+            <a:off x="8520189" y="3074097"/>
+            <a:ext cx="524777" cy="824042"/>
+          </a:xfrm>
+          <a:prstGeom prst="downArrow">
+            <a:avLst/>
+          </a:prstGeom>
+          <a:noFill/>
+        </p:spPr>
+        <p:style>
+          <a:lnRef idx="2">
+            <a:schemeClr val="accent1">
+              <a:shade val="50000"/>
+            </a:schemeClr>
+          </a:lnRef>
+          <a:fillRef idx="1">
+            <a:schemeClr val="accent1"/>
+          </a:fillRef>
+          <a:effectRef idx="0">
+            <a:schemeClr val="accent1"/>
+          </a:effectRef>
+          <a:fontRef idx="minor">
+            <a:schemeClr val="lt1"/>
+          </a:fontRef>
+        </p:style>
+        <p:txBody>
+          <a:bodyPr rtlCol="0" anchor="ctr"/>
+          <a:lstStyle/>
+          <a:p>
+            <a:pPr algn="ctr"/>
+            <a:endParaRPr lang="en-US"/>
+          </a:p>
+        </p:txBody>
+      </p:sp>
+      <p:sp>
+        <p:nvSpPr>
+          <p:cNvPr id="107" name="TextBox 106">
+            <a:extLst>
+              <a:ext uri="{FF2B5EF4-FFF2-40B4-BE49-F238E27FC236}">
+                <a16:creationId xmlns:a16="http://schemas.microsoft.com/office/drawing/2014/main" id="{7375E665-0CB2-E546-A4EE-9FB12C6B2F62}"/>
+              </a:ext>
+            </a:extLst>
+          </p:cNvPr>
+          <p:cNvSpPr txBox="1"/>
+          <p:nvPr/>
+        </p:nvSpPr>
+        <p:spPr>
+          <a:xfrm>
+            <a:off x="9186204" y="3290845"/>
+            <a:ext cx="975267" cy="307777"/>
+          </a:xfrm>
+          <a:prstGeom prst="rect">
+            <a:avLst/>
+          </a:prstGeom>
+          <a:noFill/>
+        </p:spPr>
+        <p:txBody>
+          <a:bodyPr wrap="none" rtlCol="0">
+            <a:spAutoFit/>
+          </a:bodyPr>
+          <a:lstStyle/>
+          <a:p>
+            <a:r>
+              <a:rPr lang="en-US" sz="1400" dirty="0"/>
+              <a:t>a-grouping</a:t>
+            </a:r>
+          </a:p>
+        </p:txBody>
+      </p:sp>
     </p:spTree>
     <p:extLst>
       <p:ext uri="{BB962C8B-B14F-4D97-AF65-F5344CB8AC3E}">

</xml_diff>

<commit_message>
end of Rev 1 revision -- sec 5 plus nitpicking elsewhere
</commit_message>
<xml_diff>
--- a/FGCS-2019/example-abstract-events.pptx
+++ b/FGCS-2019/example-abstract-events.pptx
@@ -259,7 +259,7 @@
           <a:p>
             <a:fld id="{39317EA7-CC4A-4A48-AF76-5FB0F739C852}" type="datetimeFigureOut">
               <a:rPr lang="en-US" smtClean="0"/>
-              <a:t>2/24/20</a:t>
+              <a:t>2/27/20</a:t>
             </a:fld>
             <a:endParaRPr lang="en-US"/>
           </a:p>
@@ -457,7 +457,7 @@
           <a:p>
             <a:fld id="{39317EA7-CC4A-4A48-AF76-5FB0F739C852}" type="datetimeFigureOut">
               <a:rPr lang="en-US" smtClean="0"/>
-              <a:t>2/24/20</a:t>
+              <a:t>2/27/20</a:t>
             </a:fld>
             <a:endParaRPr lang="en-US"/>
           </a:p>
@@ -665,7 +665,7 @@
           <a:p>
             <a:fld id="{39317EA7-CC4A-4A48-AF76-5FB0F739C852}" type="datetimeFigureOut">
               <a:rPr lang="en-US" smtClean="0"/>
-              <a:t>2/24/20</a:t>
+              <a:t>2/27/20</a:t>
             </a:fld>
             <a:endParaRPr lang="en-US"/>
           </a:p>
@@ -863,7 +863,7 @@
           <a:p>
             <a:fld id="{39317EA7-CC4A-4A48-AF76-5FB0F739C852}" type="datetimeFigureOut">
               <a:rPr lang="en-US" smtClean="0"/>
-              <a:t>2/24/20</a:t>
+              <a:t>2/27/20</a:t>
             </a:fld>
             <a:endParaRPr lang="en-US"/>
           </a:p>
@@ -1138,7 +1138,7 @@
           <a:p>
             <a:fld id="{39317EA7-CC4A-4A48-AF76-5FB0F739C852}" type="datetimeFigureOut">
               <a:rPr lang="en-US" smtClean="0"/>
-              <a:t>2/24/20</a:t>
+              <a:t>2/27/20</a:t>
             </a:fld>
             <a:endParaRPr lang="en-US"/>
           </a:p>
@@ -1403,7 +1403,7 @@
           <a:p>
             <a:fld id="{39317EA7-CC4A-4A48-AF76-5FB0F739C852}" type="datetimeFigureOut">
               <a:rPr lang="en-US" smtClean="0"/>
-              <a:t>2/24/20</a:t>
+              <a:t>2/27/20</a:t>
             </a:fld>
             <a:endParaRPr lang="en-US"/>
           </a:p>
@@ -1815,7 +1815,7 @@
           <a:p>
             <a:fld id="{39317EA7-CC4A-4A48-AF76-5FB0F739C852}" type="datetimeFigureOut">
               <a:rPr lang="en-US" smtClean="0"/>
-              <a:t>2/24/20</a:t>
+              <a:t>2/27/20</a:t>
             </a:fld>
             <a:endParaRPr lang="en-US"/>
           </a:p>
@@ -1956,7 +1956,7 @@
           <a:p>
             <a:fld id="{39317EA7-CC4A-4A48-AF76-5FB0F739C852}" type="datetimeFigureOut">
               <a:rPr lang="en-US" smtClean="0"/>
-              <a:t>2/24/20</a:t>
+              <a:t>2/27/20</a:t>
             </a:fld>
             <a:endParaRPr lang="en-US"/>
           </a:p>
@@ -2069,7 +2069,7 @@
           <a:p>
             <a:fld id="{39317EA7-CC4A-4A48-AF76-5FB0F739C852}" type="datetimeFigureOut">
               <a:rPr lang="en-US" smtClean="0"/>
-              <a:t>2/24/20</a:t>
+              <a:t>2/27/20</a:t>
             </a:fld>
             <a:endParaRPr lang="en-US"/>
           </a:p>
@@ -2380,7 +2380,7 @@
           <a:p>
             <a:fld id="{39317EA7-CC4A-4A48-AF76-5FB0F739C852}" type="datetimeFigureOut">
               <a:rPr lang="en-US" smtClean="0"/>
-              <a:t>2/24/20</a:t>
+              <a:t>2/27/20</a:t>
             </a:fld>
             <a:endParaRPr lang="en-US"/>
           </a:p>
@@ -2668,7 +2668,7 @@
           <a:p>
             <a:fld id="{39317EA7-CC4A-4A48-AF76-5FB0F739C852}" type="datetimeFigureOut">
               <a:rPr lang="en-US" smtClean="0"/>
-              <a:t>2/24/20</a:t>
+              <a:t>2/27/20</a:t>
             </a:fld>
             <a:endParaRPr lang="en-US"/>
           </a:p>
@@ -2909,7 +2909,7 @@
           <a:p>
             <a:fld id="{39317EA7-CC4A-4A48-AF76-5FB0F739C852}" type="datetimeFigureOut">
               <a:rPr lang="en-US" smtClean="0"/>
-              <a:t>2/24/20</a:t>
+              <a:t>2/27/20</a:t>
             </a:fld>
             <a:endParaRPr lang="en-US"/>
           </a:p>
@@ -4074,7 +4074,7 @@
             </a:r>
             <a:r>
               <a:rPr lang="en-US" baseline="-25000" dirty="0"/>
-              <a:t>3y</a:t>
+              <a:t>3z</a:t>
             </a:r>
           </a:p>
         </p:txBody>
@@ -4688,13 +4688,18 @@
           <a:lstStyle/>
           <a:p>
             <a:r>
-              <a:rPr lang="en-US" dirty="0"/>
+              <a:rPr lang="en-US"/>
               <a:t>g</a:t>
             </a:r>
             <a:r>
               <a:rPr lang="en-US" baseline="-25000" dirty="0"/>
-              <a:t>2N</a:t>
-            </a:r>
+              <a:t>3</a:t>
+            </a:r>
+            <a:r>
+              <a:rPr lang="en-US" baseline="-25000"/>
+              <a:t>N</a:t>
+            </a:r>
+            <a:endParaRPr lang="en-US" baseline="-25000" dirty="0"/>
           </a:p>
         </p:txBody>
       </p:sp>
@@ -4947,7 +4952,7 @@
             </a:r>
             <a:r>
               <a:rPr lang="en-US" baseline="-25000" dirty="0"/>
-              <a:t>1z</a:t>
+              <a:t>1y</a:t>
             </a:r>
           </a:p>
         </p:txBody>

</xml_diff>